<commit_message>
docs: update a pipeline image
</commit_message>
<xml_diff>
--- a/Docs/Images/rsd.pptx
+++ b/Docs/Images/rsd.pptx
@@ -213,7 +213,7 @@
           <a:p>
             <a:fld id="{2ABE53D4-1A7B-4FFE-8A95-4265B045F058}" type="datetimeFigureOut">
               <a:rPr kumimoji="1" lang="ja-JP" altLang="en-US" smtClean="0"/>
-              <a:t>2023/3/28</a:t>
+              <a:t>2023/4/6</a:t>
             </a:fld>
             <a:endParaRPr kumimoji="1" lang="ja-JP" altLang="en-US"/>
           </a:p>
@@ -5989,7 +5989,7 @@
         </p:nvSpPr>
         <p:spPr>
           <a:xfrm rot="16200000">
-            <a:off x="9220250" y="4149010"/>
+            <a:off x="9220250" y="4239015"/>
             <a:ext cx="360000" cy="720000"/>
           </a:xfrm>
           <a:prstGeom prst="can">
@@ -6047,7 +6047,7 @@
         </p:nvSpPr>
         <p:spPr>
           <a:xfrm rot="16200000">
-            <a:off x="8615812" y="4149010"/>
+            <a:off x="8615812" y="4239015"/>
             <a:ext cx="360000" cy="720000"/>
           </a:xfrm>
           <a:prstGeom prst="can">
@@ -6112,7 +6112,7 @@
         </p:nvSpPr>
         <p:spPr>
           <a:xfrm rot="16200000">
-            <a:off x="7973671" y="4149010"/>
+            <a:off x="7973671" y="4239015"/>
             <a:ext cx="360000" cy="720000"/>
           </a:xfrm>
           <a:prstGeom prst="can">
@@ -7350,7 +7350,7 @@
         </p:nvSpPr>
         <p:spPr>
           <a:xfrm>
-            <a:off x="8622045" y="2708992"/>
+            <a:off x="8573472" y="2708992"/>
             <a:ext cx="1178048" cy="492443"/>
           </a:xfrm>
           <a:prstGeom prst="rect">
@@ -7434,7 +7434,7 @@
         </p:nvSpPr>
         <p:spPr>
           <a:xfrm>
-            <a:off x="8590623" y="3390771"/>
+            <a:off x="8573472" y="3390771"/>
             <a:ext cx="963222" cy="246221"/>
           </a:xfrm>
           <a:prstGeom prst="rect">
@@ -7509,13 +7509,15 @@
       <p:cxnSp>
         <p:nvCxnSpPr>
           <p:cNvPr id="30" name="直線コネクタ 29"/>
-          <p:cNvCxnSpPr/>
+          <p:cNvCxnSpPr>
+            <a:cxnSpLocks/>
+          </p:cNvCxnSpPr>
           <p:nvPr/>
         </p:nvCxnSpPr>
         <p:spPr>
           <a:xfrm>
             <a:off x="3941993" y="1448978"/>
-            <a:ext cx="4495041" cy="0"/>
+            <a:ext cx="5850065" cy="0"/>
           </a:xfrm>
           <a:prstGeom prst="line">
             <a:avLst/>
@@ -7613,8 +7615,8 @@
         </p:nvSpPr>
         <p:spPr>
           <a:xfrm>
-            <a:off x="4121995" y="998973"/>
-            <a:ext cx="4495041" cy="563427"/>
+            <a:off x="3941993" y="998973"/>
+            <a:ext cx="5850065" cy="563427"/>
           </a:xfrm>
           <a:prstGeom prst="rect">
             <a:avLst/>
@@ -9074,7 +9076,7 @@
         </p:nvSpPr>
         <p:spPr>
           <a:xfrm rot="16200000">
-            <a:off x="7332729" y="4149010"/>
+            <a:off x="7332729" y="4239015"/>
             <a:ext cx="360000" cy="720000"/>
           </a:xfrm>
           <a:prstGeom prst="can">
@@ -9139,7 +9141,7 @@
         </p:nvSpPr>
         <p:spPr>
           <a:xfrm rot="16200000">
-            <a:off x="6690588" y="4149010"/>
+            <a:off x="6690588" y="4239015"/>
             <a:ext cx="360000" cy="720000"/>
           </a:xfrm>
           <a:prstGeom prst="can">
@@ -9204,7 +9206,7 @@
         </p:nvSpPr>
         <p:spPr>
           <a:xfrm rot="16200000">
-            <a:off x="6048436" y="4149010"/>
+            <a:off x="6048436" y="4239015"/>
             <a:ext cx="360000" cy="720000"/>
           </a:xfrm>
           <a:prstGeom prst="can">
@@ -9269,7 +9271,7 @@
         </p:nvSpPr>
         <p:spPr>
           <a:xfrm rot="16200000">
-            <a:off x="5406288" y="4149010"/>
+            <a:off x="5406288" y="4239015"/>
             <a:ext cx="360000" cy="720000"/>
           </a:xfrm>
           <a:prstGeom prst="can">
@@ -9327,7 +9329,7 @@
         </p:nvSpPr>
         <p:spPr>
           <a:xfrm rot="16200000">
-            <a:off x="4764140" y="4149009"/>
+            <a:off x="4764140" y="4239014"/>
             <a:ext cx="360000" cy="720000"/>
           </a:xfrm>
           <a:prstGeom prst="can">
@@ -9385,7 +9387,7 @@
         </p:nvSpPr>
         <p:spPr>
           <a:xfrm rot="16200000">
-            <a:off x="4121993" y="4149010"/>
+            <a:off x="4121993" y="4239015"/>
             <a:ext cx="360000" cy="720000"/>
           </a:xfrm>
           <a:prstGeom prst="can">
@@ -9443,7 +9445,7 @@
         </p:nvSpPr>
         <p:spPr>
           <a:xfrm>
-            <a:off x="9814473" y="4379255"/>
+            <a:off x="9814473" y="4469260"/>
             <a:ext cx="360004" cy="246221"/>
           </a:xfrm>
           <a:prstGeom prst="rect">

</xml_diff>